<commit_message>
matlab file for periodic data identification
</commit_message>
<xml_diff>
--- a/Assignment 1/FB1_12112021.pptx
+++ b/Assignment 1/FB1_12112021.pptx
@@ -6,10 +6,10 @@
     <p:sldMasterId id="2147483694" r:id="rId2"/>
   </p:sldMasterIdLst>
   <p:notesMasterIdLst>
-    <p:notesMasterId r:id="rId9"/>
+    <p:notesMasterId r:id="rId13"/>
   </p:notesMasterIdLst>
   <p:handoutMasterIdLst>
-    <p:handoutMasterId r:id="rId10"/>
+    <p:handoutMasterId r:id="rId14"/>
   </p:handoutMasterIdLst>
   <p:sldIdLst>
     <p:sldId id="261" r:id="rId3"/>
@@ -18,6 +18,10 @@
     <p:sldId id="271" r:id="rId6"/>
     <p:sldId id="272" r:id="rId7"/>
     <p:sldId id="273" r:id="rId8"/>
+    <p:sldId id="274" r:id="rId9"/>
+    <p:sldId id="276" r:id="rId10"/>
+    <p:sldId id="275" r:id="rId11"/>
+    <p:sldId id="277" r:id="rId12"/>
   </p:sldIdLst>
   <p:sldSz cx="12192000" cy="6858000"/>
   <p:notesSz cx="6858000" cy="9144000"/>
@@ -5081,6 +5085,552 @@
 </p:sld>
 </file>
 
+<file path=ppt/slides/slide10.xml><?xml version="1.0" encoding="utf-8"?>
+<p:sld xmlns:a="http://schemas.openxmlformats.org/drawingml/2006/main" xmlns:r="http://schemas.openxmlformats.org/officeDocument/2006/relationships" xmlns:p="http://schemas.openxmlformats.org/presentationml/2006/main">
+  <p:cSld>
+    <p:spTree>
+      <p:nvGrpSpPr>
+        <p:cNvPr id="1" name=""/>
+        <p:cNvGrpSpPr/>
+        <p:nvPr/>
+      </p:nvGrpSpPr>
+      <p:grpSpPr>
+        <a:xfrm>
+          <a:off x="0" y="0"/>
+          <a:ext cx="0" cy="0"/>
+          <a:chOff x="0" y="0"/>
+          <a:chExt cx="0" cy="0"/>
+        </a:xfrm>
+      </p:grpSpPr>
+      <p:sp>
+        <p:nvSpPr>
+          <p:cNvPr id="4" name="Tijdelijke aanduiding voor dianummer 3">
+            <a:extLst>
+              <a:ext uri="{FF2B5EF4-FFF2-40B4-BE49-F238E27FC236}">
+                <a16:creationId xmlns:a16="http://schemas.microsoft.com/office/drawing/2014/main" id="{D1DBAB9A-B3F9-4068-8D9E-EC41B3E2AF8F}"/>
+              </a:ext>
+            </a:extLst>
+          </p:cNvPr>
+          <p:cNvSpPr>
+            <a:spLocks noGrp="1"/>
+          </p:cNvSpPr>
+          <p:nvPr>
+            <p:ph type="sldNum" sz="quarter" idx="12"/>
+          </p:nvPr>
+        </p:nvSpPr>
+        <p:spPr/>
+        <p:txBody>
+          <a:bodyPr/>
+          <a:lstStyle/>
+          <a:p>
+            <a:fld id="{0A297500-7527-634B-90F4-69D0994C32B4}" type="slidenum">
+              <a:rPr lang="nl-NL" smtClean="0"/>
+              <a:t>10</a:t>
+            </a:fld>
+            <a:endParaRPr lang="nl-NL"/>
+          </a:p>
+        </p:txBody>
+      </p:sp>
+      <p:sp>
+        <p:nvSpPr>
+          <p:cNvPr id="5" name="Titel 4">
+            <a:extLst>
+              <a:ext uri="{FF2B5EF4-FFF2-40B4-BE49-F238E27FC236}">
+                <a16:creationId xmlns:a16="http://schemas.microsoft.com/office/drawing/2014/main" id="{3A8015CA-63D6-4E43-92D0-5A6E0C7EA02C}"/>
+              </a:ext>
+            </a:extLst>
+          </p:cNvPr>
+          <p:cNvSpPr>
+            <a:spLocks noGrp="1"/>
+          </p:cNvSpPr>
+          <p:nvPr>
+            <p:ph type="title"/>
+          </p:nvPr>
+        </p:nvSpPr>
+        <p:spPr/>
+        <p:txBody>
+          <a:bodyPr>
+            <a:normAutofit/>
+          </a:bodyPr>
+          <a:lstStyle/>
+          <a:p>
+            <a:r>
+              <a:rPr lang="nl-BE" dirty="0" err="1"/>
+              <a:t>Result</a:t>
+            </a:r>
+            <a:r>
+              <a:rPr lang="nl-BE" dirty="0"/>
+              <a:t>: </a:t>
+            </a:r>
+            <a:r>
+              <a:rPr lang="nl-BE" dirty="0" err="1"/>
+              <a:t>validation</a:t>
+            </a:r>
+            <a:endParaRPr lang="nl-BE" dirty="0"/>
+          </a:p>
+        </p:txBody>
+      </p:sp>
+      <p:sp>
+        <p:nvSpPr>
+          <p:cNvPr id="7" name="Tijdelijke aanduiding voor voettekst 1">
+            <a:extLst>
+              <a:ext uri="{FF2B5EF4-FFF2-40B4-BE49-F238E27FC236}">
+                <a16:creationId xmlns:a16="http://schemas.microsoft.com/office/drawing/2014/main" id="{F85CF95F-E3E4-4E64-9557-100028F42EA3}"/>
+              </a:ext>
+            </a:extLst>
+          </p:cNvPr>
+          <p:cNvSpPr txBox="1">
+            <a:spLocks/>
+          </p:cNvSpPr>
+          <p:nvPr/>
+        </p:nvSpPr>
+        <p:spPr>
+          <a:xfrm>
+            <a:off x="6033600" y="6227755"/>
+            <a:ext cx="4993200" cy="648000"/>
+          </a:xfrm>
+          <a:prstGeom prst="rect">
+            <a:avLst/>
+          </a:prstGeom>
+          <a:noFill/>
+          <a:ln>
+            <a:noFill/>
+          </a:ln>
+        </p:spPr>
+        <p:txBody>
+          <a:bodyPr spcFirstLastPara="1" wrap="square" lIns="0" tIns="0" rIns="180000" bIns="0" anchor="ctr" anchorCtr="0">
+            <a:noAutofit/>
+          </a:bodyPr>
+          <a:lstStyle>
+            <a:defPPr marR="0" lvl="0" algn="l" rtl="0">
+              <a:lnSpc>
+                <a:spcPct val="100000"/>
+              </a:lnSpc>
+              <a:spcBef>
+                <a:spcPts val="0"/>
+              </a:spcBef>
+              <a:spcAft>
+                <a:spcPts val="0"/>
+              </a:spcAft>
+            </a:defPPr>
+            <a:lvl1pPr marR="0" lvl="0" algn="r" rtl="0">
+              <a:lnSpc>
+                <a:spcPct val="100000"/>
+              </a:lnSpc>
+              <a:spcBef>
+                <a:spcPts val="0"/>
+              </a:spcBef>
+              <a:spcAft>
+                <a:spcPts val="0"/>
+              </a:spcAft>
+              <a:buClr>
+                <a:srgbClr val="000000"/>
+              </a:buClr>
+              <a:buSzPts val="1400"/>
+              <a:buFont typeface="Arial"/>
+              <a:buNone/>
+              <a:defRPr sz="1000" b="0" i="0" u="none" strike="noStrike" cap="none">
+                <a:solidFill>
+                  <a:schemeClr val="lt1"/>
+                </a:solidFill>
+                <a:latin typeface="Arial"/>
+                <a:ea typeface="Arial"/>
+                <a:cs typeface="Arial"/>
+                <a:sym typeface="Arial"/>
+              </a:defRPr>
+            </a:lvl1pPr>
+            <a:lvl2pPr marR="0" lvl="1" algn="l" rtl="0">
+              <a:lnSpc>
+                <a:spcPct val="100000"/>
+              </a:lnSpc>
+              <a:spcBef>
+                <a:spcPts val="0"/>
+              </a:spcBef>
+              <a:spcAft>
+                <a:spcPts val="0"/>
+              </a:spcAft>
+              <a:buClr>
+                <a:srgbClr val="000000"/>
+              </a:buClr>
+              <a:buSzPts val="1400"/>
+              <a:buFont typeface="Arial"/>
+              <a:buNone/>
+              <a:defRPr sz="1800" b="0" i="0" u="none" strike="noStrike" cap="none">
+                <a:solidFill>
+                  <a:schemeClr val="dk1"/>
+                </a:solidFill>
+                <a:latin typeface="Arial"/>
+                <a:ea typeface="Arial"/>
+                <a:cs typeface="Arial"/>
+                <a:sym typeface="Arial"/>
+              </a:defRPr>
+            </a:lvl2pPr>
+            <a:lvl3pPr marR="0" lvl="2" algn="l" rtl="0">
+              <a:lnSpc>
+                <a:spcPct val="100000"/>
+              </a:lnSpc>
+              <a:spcBef>
+                <a:spcPts val="0"/>
+              </a:spcBef>
+              <a:spcAft>
+                <a:spcPts val="0"/>
+              </a:spcAft>
+              <a:buClr>
+                <a:srgbClr val="000000"/>
+              </a:buClr>
+              <a:buSzPts val="1400"/>
+              <a:buFont typeface="Arial"/>
+              <a:buNone/>
+              <a:defRPr sz="1800" b="0" i="0" u="none" strike="noStrike" cap="none">
+                <a:solidFill>
+                  <a:schemeClr val="dk1"/>
+                </a:solidFill>
+                <a:latin typeface="Arial"/>
+                <a:ea typeface="Arial"/>
+                <a:cs typeface="Arial"/>
+                <a:sym typeface="Arial"/>
+              </a:defRPr>
+            </a:lvl3pPr>
+            <a:lvl4pPr marR="0" lvl="3" algn="l" rtl="0">
+              <a:lnSpc>
+                <a:spcPct val="100000"/>
+              </a:lnSpc>
+              <a:spcBef>
+                <a:spcPts val="0"/>
+              </a:spcBef>
+              <a:spcAft>
+                <a:spcPts val="0"/>
+              </a:spcAft>
+              <a:buClr>
+                <a:srgbClr val="000000"/>
+              </a:buClr>
+              <a:buSzPts val="1400"/>
+              <a:buFont typeface="Arial"/>
+              <a:buNone/>
+              <a:defRPr sz="1800" b="0" i="0" u="none" strike="noStrike" cap="none">
+                <a:solidFill>
+                  <a:schemeClr val="dk1"/>
+                </a:solidFill>
+                <a:latin typeface="Arial"/>
+                <a:ea typeface="Arial"/>
+                <a:cs typeface="Arial"/>
+                <a:sym typeface="Arial"/>
+              </a:defRPr>
+            </a:lvl4pPr>
+            <a:lvl5pPr marR="0" lvl="4" algn="l" rtl="0">
+              <a:lnSpc>
+                <a:spcPct val="100000"/>
+              </a:lnSpc>
+              <a:spcBef>
+                <a:spcPts val="0"/>
+              </a:spcBef>
+              <a:spcAft>
+                <a:spcPts val="0"/>
+              </a:spcAft>
+              <a:buClr>
+                <a:srgbClr val="000000"/>
+              </a:buClr>
+              <a:buSzPts val="1400"/>
+              <a:buFont typeface="Arial"/>
+              <a:buNone/>
+              <a:defRPr sz="1800" b="0" i="0" u="none" strike="noStrike" cap="none">
+                <a:solidFill>
+                  <a:schemeClr val="dk1"/>
+                </a:solidFill>
+                <a:latin typeface="Arial"/>
+                <a:ea typeface="Arial"/>
+                <a:cs typeface="Arial"/>
+                <a:sym typeface="Arial"/>
+              </a:defRPr>
+            </a:lvl5pPr>
+            <a:lvl6pPr marR="0" lvl="5" algn="l" rtl="0">
+              <a:lnSpc>
+                <a:spcPct val="100000"/>
+              </a:lnSpc>
+              <a:spcBef>
+                <a:spcPts val="0"/>
+              </a:spcBef>
+              <a:spcAft>
+                <a:spcPts val="0"/>
+              </a:spcAft>
+              <a:buClr>
+                <a:srgbClr val="000000"/>
+              </a:buClr>
+              <a:buSzPts val="1400"/>
+              <a:buFont typeface="Arial"/>
+              <a:buNone/>
+              <a:defRPr sz="1800" b="0" i="0" u="none" strike="noStrike" cap="none">
+                <a:solidFill>
+                  <a:schemeClr val="dk1"/>
+                </a:solidFill>
+                <a:latin typeface="Arial"/>
+                <a:ea typeface="Arial"/>
+                <a:cs typeface="Arial"/>
+                <a:sym typeface="Arial"/>
+              </a:defRPr>
+            </a:lvl6pPr>
+            <a:lvl7pPr marR="0" lvl="6" algn="l" rtl="0">
+              <a:lnSpc>
+                <a:spcPct val="100000"/>
+              </a:lnSpc>
+              <a:spcBef>
+                <a:spcPts val="0"/>
+              </a:spcBef>
+              <a:spcAft>
+                <a:spcPts val="0"/>
+              </a:spcAft>
+              <a:buClr>
+                <a:srgbClr val="000000"/>
+              </a:buClr>
+              <a:buSzPts val="1400"/>
+              <a:buFont typeface="Arial"/>
+              <a:buNone/>
+              <a:defRPr sz="1800" b="0" i="0" u="none" strike="noStrike" cap="none">
+                <a:solidFill>
+                  <a:schemeClr val="dk1"/>
+                </a:solidFill>
+                <a:latin typeface="Arial"/>
+                <a:ea typeface="Arial"/>
+                <a:cs typeface="Arial"/>
+                <a:sym typeface="Arial"/>
+              </a:defRPr>
+            </a:lvl7pPr>
+            <a:lvl8pPr marR="0" lvl="7" algn="l" rtl="0">
+              <a:lnSpc>
+                <a:spcPct val="100000"/>
+              </a:lnSpc>
+              <a:spcBef>
+                <a:spcPts val="0"/>
+              </a:spcBef>
+              <a:spcAft>
+                <a:spcPts val="0"/>
+              </a:spcAft>
+              <a:buClr>
+                <a:srgbClr val="000000"/>
+              </a:buClr>
+              <a:buSzPts val="1400"/>
+              <a:buFont typeface="Arial"/>
+              <a:buNone/>
+              <a:defRPr sz="1800" b="0" i="0" u="none" strike="noStrike" cap="none">
+                <a:solidFill>
+                  <a:schemeClr val="dk1"/>
+                </a:solidFill>
+                <a:latin typeface="Arial"/>
+                <a:ea typeface="Arial"/>
+                <a:cs typeface="Arial"/>
+                <a:sym typeface="Arial"/>
+              </a:defRPr>
+            </a:lvl8pPr>
+            <a:lvl9pPr marR="0" lvl="8" algn="l" rtl="0">
+              <a:lnSpc>
+                <a:spcPct val="100000"/>
+              </a:lnSpc>
+              <a:spcBef>
+                <a:spcPts val="0"/>
+              </a:spcBef>
+              <a:spcAft>
+                <a:spcPts val="0"/>
+              </a:spcAft>
+              <a:buClr>
+                <a:srgbClr val="000000"/>
+              </a:buClr>
+              <a:buSzPts val="1400"/>
+              <a:buFont typeface="Arial"/>
+              <a:buNone/>
+              <a:defRPr sz="1800" b="0" i="0" u="none" strike="noStrike" cap="none">
+                <a:solidFill>
+                  <a:schemeClr val="dk1"/>
+                </a:solidFill>
+                <a:latin typeface="Arial"/>
+                <a:ea typeface="Arial"/>
+                <a:cs typeface="Arial"/>
+                <a:sym typeface="Arial"/>
+              </a:defRPr>
+            </a:lvl9pPr>
+          </a:lstStyle>
+          <a:p>
+            <a:r>
+              <a:rPr lang="nl-BE" b="1" dirty="0"/>
+              <a:t>P&amp;O: elektrotechniek </a:t>
+            </a:r>
+            <a:r>
+              <a:rPr lang="nl-BE" dirty="0"/>
+              <a:t>(B-KUL-H01Q6C)</a:t>
+            </a:r>
+          </a:p>
+          <a:p>
+            <a:r>
+              <a:rPr lang="nl-BE" b="1" dirty="0"/>
+              <a:t>EAGLE 2</a:t>
+            </a:r>
+          </a:p>
+          <a:p>
+            <a:r>
+              <a:rPr lang="nl-BE" b="1" dirty="0"/>
+              <a:t>!!!</a:t>
+            </a:r>
+            <a:r>
+              <a:rPr lang="nl-BE" b="1" dirty="0" err="1"/>
+              <a:t>Fill</a:t>
+            </a:r>
+            <a:r>
+              <a:rPr lang="nl-BE" b="1" dirty="0"/>
+              <a:t> in </a:t>
+            </a:r>
+            <a:r>
+              <a:rPr lang="nl-BE" b="1" dirty="0" err="1"/>
+              <a:t>your</a:t>
+            </a:r>
+            <a:r>
+              <a:rPr lang="nl-BE" b="1" dirty="0"/>
+              <a:t> module!!!</a:t>
+            </a:r>
+          </a:p>
+        </p:txBody>
+      </p:sp>
+      <p:pic>
+        <p:nvPicPr>
+          <p:cNvPr id="8" name="Afbeelding 7">
+            <a:extLst>
+              <a:ext uri="{FF2B5EF4-FFF2-40B4-BE49-F238E27FC236}">
+                <a16:creationId xmlns:a16="http://schemas.microsoft.com/office/drawing/2014/main" id="{FF87AD54-75E6-45A0-BF50-99077175D8B6}"/>
+              </a:ext>
+            </a:extLst>
+          </p:cNvPr>
+          <p:cNvPicPr>
+            <a:picLocks noChangeAspect="1"/>
+          </p:cNvPicPr>
+          <p:nvPr/>
+        </p:nvPicPr>
+        <p:blipFill>
+          <a:blip r:embed="rId2"/>
+          <a:stretch>
+            <a:fillRect/>
+          </a:stretch>
+        </p:blipFill>
+        <p:spPr>
+          <a:xfrm>
+            <a:off x="6718862" y="6210000"/>
+            <a:ext cx="719094" cy="683926"/>
+          </a:xfrm>
+          <a:prstGeom prst="rect">
+            <a:avLst/>
+          </a:prstGeom>
+        </p:spPr>
+      </p:pic>
+      <p:pic>
+        <p:nvPicPr>
+          <p:cNvPr id="9" name="Afbeelding 8">
+            <a:extLst>
+              <a:ext uri="{FF2B5EF4-FFF2-40B4-BE49-F238E27FC236}">
+                <a16:creationId xmlns:a16="http://schemas.microsoft.com/office/drawing/2014/main" id="{B7DB5651-C28D-418B-B3D9-FCB04EDE122B}"/>
+              </a:ext>
+            </a:extLst>
+          </p:cNvPr>
+          <p:cNvPicPr>
+            <a:picLocks noChangeAspect="1"/>
+          </p:cNvPicPr>
+          <p:nvPr/>
+        </p:nvPicPr>
+        <p:blipFill>
+          <a:blip r:embed="rId3"/>
+          <a:stretch>
+            <a:fillRect/>
+          </a:stretch>
+        </p:blipFill>
+        <p:spPr>
+          <a:xfrm>
+            <a:off x="417760" y="1668545"/>
+            <a:ext cx="11231680" cy="4221192"/>
+          </a:xfrm>
+          <a:prstGeom prst="rect">
+            <a:avLst/>
+          </a:prstGeom>
+        </p:spPr>
+      </p:pic>
+      <p:sp>
+        <p:nvSpPr>
+          <p:cNvPr id="11" name="Tekstvak 10">
+            <a:extLst>
+              <a:ext uri="{FF2B5EF4-FFF2-40B4-BE49-F238E27FC236}">
+                <a16:creationId xmlns:a16="http://schemas.microsoft.com/office/drawing/2014/main" id="{EA547A3E-019A-4B37-9359-8BA432A71D18}"/>
+              </a:ext>
+            </a:extLst>
+          </p:cNvPr>
+          <p:cNvSpPr txBox="1"/>
+          <p:nvPr/>
+        </p:nvSpPr>
+        <p:spPr>
+          <a:xfrm>
+            <a:off x="417760" y="1311818"/>
+            <a:ext cx="1544012" cy="369332"/>
+          </a:xfrm>
+          <a:prstGeom prst="rect">
+            <a:avLst/>
+          </a:prstGeom>
+          <a:noFill/>
+        </p:spPr>
+        <p:txBody>
+          <a:bodyPr wrap="none" rtlCol="0">
+            <a:spAutoFit/>
+          </a:bodyPr>
+          <a:lstStyle/>
+          <a:p>
+            <a:r>
+              <a:rPr lang="en-GB" dirty="0"/>
+              <a:t>Speed model</a:t>
+            </a:r>
+          </a:p>
+        </p:txBody>
+      </p:sp>
+      <p:sp>
+        <p:nvSpPr>
+          <p:cNvPr id="12" name="Tekstvak 11">
+            <a:extLst>
+              <a:ext uri="{FF2B5EF4-FFF2-40B4-BE49-F238E27FC236}">
+                <a16:creationId xmlns:a16="http://schemas.microsoft.com/office/drawing/2014/main" id="{6BF4DAAC-1025-4067-B23A-6A941209545B}"/>
+              </a:ext>
+            </a:extLst>
+          </p:cNvPr>
+          <p:cNvSpPr txBox="1"/>
+          <p:nvPr/>
+        </p:nvSpPr>
+        <p:spPr>
+          <a:xfrm>
+            <a:off x="6110544" y="1290336"/>
+            <a:ext cx="1390124" cy="369332"/>
+          </a:xfrm>
+          <a:prstGeom prst="rect">
+            <a:avLst/>
+          </a:prstGeom>
+          <a:noFill/>
+        </p:spPr>
+        <p:txBody>
+          <a:bodyPr wrap="none" rtlCol="0">
+            <a:spAutoFit/>
+          </a:bodyPr>
+          <a:lstStyle/>
+          <a:p>
+            <a:r>
+              <a:rPr lang="en-GB" dirty="0"/>
+              <a:t>Posit model</a:t>
+            </a:r>
+          </a:p>
+        </p:txBody>
+      </p:sp>
+    </p:spTree>
+    <p:extLst>
+      <p:ext uri="{BB962C8B-B14F-4D97-AF65-F5344CB8AC3E}">
+        <p14:creationId xmlns:p14="http://schemas.microsoft.com/office/powerpoint/2010/main" val="3333042143"/>
+      </p:ext>
+    </p:extLst>
+  </p:cSld>
+  <p:clrMapOvr>
+    <a:masterClrMapping/>
+  </p:clrMapOvr>
+</p:sld>
+</file>
+
 <file path=ppt/slides/slide2.xml><?xml version="1.0" encoding="utf-8"?>
 <p:sld xmlns:a="http://schemas.openxmlformats.org/drawingml/2006/main" xmlns:r="http://schemas.openxmlformats.org/officeDocument/2006/relationships" xmlns:p="http://schemas.openxmlformats.org/presentationml/2006/main">
   <p:cSld>
@@ -7776,6 +8326,1446 @@
     <p:extLst>
       <p:ext uri="{BB962C8B-B14F-4D97-AF65-F5344CB8AC3E}">
         <p14:creationId xmlns:p14="http://schemas.microsoft.com/office/powerpoint/2010/main" val="2908948048"/>
+      </p:ext>
+    </p:extLst>
+  </p:cSld>
+  <p:clrMapOvr>
+    <a:masterClrMapping/>
+  </p:clrMapOvr>
+</p:sld>
+</file>
+
+<file path=ppt/slides/slide7.xml><?xml version="1.0" encoding="utf-8"?>
+<p:sld xmlns:a="http://schemas.openxmlformats.org/drawingml/2006/main" xmlns:r="http://schemas.openxmlformats.org/officeDocument/2006/relationships" xmlns:p="http://schemas.openxmlformats.org/presentationml/2006/main">
+  <p:cSld>
+    <p:spTree>
+      <p:nvGrpSpPr>
+        <p:cNvPr id="1" name=""/>
+        <p:cNvGrpSpPr/>
+        <p:nvPr/>
+      </p:nvGrpSpPr>
+      <p:grpSpPr>
+        <a:xfrm>
+          <a:off x="0" y="0"/>
+          <a:ext cx="0" cy="0"/>
+          <a:chOff x="0" y="0"/>
+          <a:chExt cx="0" cy="0"/>
+        </a:xfrm>
+      </p:grpSpPr>
+      <p:sp>
+        <p:nvSpPr>
+          <p:cNvPr id="4" name="Tijdelijke aanduiding voor dianummer 3">
+            <a:extLst>
+              <a:ext uri="{FF2B5EF4-FFF2-40B4-BE49-F238E27FC236}">
+                <a16:creationId xmlns:a16="http://schemas.microsoft.com/office/drawing/2014/main" id="{D1DBAB9A-B3F9-4068-8D9E-EC41B3E2AF8F}"/>
+              </a:ext>
+            </a:extLst>
+          </p:cNvPr>
+          <p:cNvSpPr>
+            <a:spLocks noGrp="1"/>
+          </p:cNvSpPr>
+          <p:nvPr>
+            <p:ph type="sldNum" sz="quarter" idx="12"/>
+          </p:nvPr>
+        </p:nvSpPr>
+        <p:spPr/>
+        <p:txBody>
+          <a:bodyPr/>
+          <a:lstStyle/>
+          <a:p>
+            <a:fld id="{0A297500-7527-634B-90F4-69D0994C32B4}" type="slidenum">
+              <a:rPr lang="nl-NL" smtClean="0"/>
+              <a:t>7</a:t>
+            </a:fld>
+            <a:endParaRPr lang="nl-NL"/>
+          </a:p>
+        </p:txBody>
+      </p:sp>
+      <p:sp>
+        <p:nvSpPr>
+          <p:cNvPr id="5" name="Titel 4">
+            <a:extLst>
+              <a:ext uri="{FF2B5EF4-FFF2-40B4-BE49-F238E27FC236}">
+                <a16:creationId xmlns:a16="http://schemas.microsoft.com/office/drawing/2014/main" id="{3A8015CA-63D6-4E43-92D0-5A6E0C7EA02C}"/>
+              </a:ext>
+            </a:extLst>
+          </p:cNvPr>
+          <p:cNvSpPr>
+            <a:spLocks noGrp="1"/>
+          </p:cNvSpPr>
+          <p:nvPr>
+            <p:ph type="title"/>
+          </p:nvPr>
+        </p:nvSpPr>
+        <p:spPr/>
+        <p:txBody>
+          <a:bodyPr>
+            <a:normAutofit/>
+          </a:bodyPr>
+          <a:lstStyle/>
+          <a:p>
+            <a:r>
+              <a:rPr lang="nl-BE" dirty="0" err="1"/>
+              <a:t>Excitation</a:t>
+            </a:r>
+            <a:endParaRPr lang="nl-BE" dirty="0"/>
+          </a:p>
+        </p:txBody>
+      </p:sp>
+      <p:sp>
+        <p:nvSpPr>
+          <p:cNvPr id="7" name="Tijdelijke aanduiding voor voettekst 1">
+            <a:extLst>
+              <a:ext uri="{FF2B5EF4-FFF2-40B4-BE49-F238E27FC236}">
+                <a16:creationId xmlns:a16="http://schemas.microsoft.com/office/drawing/2014/main" id="{F85CF95F-E3E4-4E64-9557-100028F42EA3}"/>
+              </a:ext>
+            </a:extLst>
+          </p:cNvPr>
+          <p:cNvSpPr txBox="1">
+            <a:spLocks/>
+          </p:cNvSpPr>
+          <p:nvPr/>
+        </p:nvSpPr>
+        <p:spPr>
+          <a:xfrm>
+            <a:off x="6033600" y="6227755"/>
+            <a:ext cx="4993200" cy="648000"/>
+          </a:xfrm>
+          <a:prstGeom prst="rect">
+            <a:avLst/>
+          </a:prstGeom>
+          <a:noFill/>
+          <a:ln>
+            <a:noFill/>
+          </a:ln>
+        </p:spPr>
+        <p:txBody>
+          <a:bodyPr spcFirstLastPara="1" wrap="square" lIns="0" tIns="0" rIns="180000" bIns="0" anchor="ctr" anchorCtr="0">
+            <a:noAutofit/>
+          </a:bodyPr>
+          <a:lstStyle>
+            <a:defPPr marR="0" lvl="0" algn="l" rtl="0">
+              <a:lnSpc>
+                <a:spcPct val="100000"/>
+              </a:lnSpc>
+              <a:spcBef>
+                <a:spcPts val="0"/>
+              </a:spcBef>
+              <a:spcAft>
+                <a:spcPts val="0"/>
+              </a:spcAft>
+            </a:defPPr>
+            <a:lvl1pPr marR="0" lvl="0" algn="r" rtl="0">
+              <a:lnSpc>
+                <a:spcPct val="100000"/>
+              </a:lnSpc>
+              <a:spcBef>
+                <a:spcPts val="0"/>
+              </a:spcBef>
+              <a:spcAft>
+                <a:spcPts val="0"/>
+              </a:spcAft>
+              <a:buClr>
+                <a:srgbClr val="000000"/>
+              </a:buClr>
+              <a:buSzPts val="1400"/>
+              <a:buFont typeface="Arial"/>
+              <a:buNone/>
+              <a:defRPr sz="1000" b="0" i="0" u="none" strike="noStrike" cap="none">
+                <a:solidFill>
+                  <a:schemeClr val="lt1"/>
+                </a:solidFill>
+                <a:latin typeface="Arial"/>
+                <a:ea typeface="Arial"/>
+                <a:cs typeface="Arial"/>
+                <a:sym typeface="Arial"/>
+              </a:defRPr>
+            </a:lvl1pPr>
+            <a:lvl2pPr marR="0" lvl="1" algn="l" rtl="0">
+              <a:lnSpc>
+                <a:spcPct val="100000"/>
+              </a:lnSpc>
+              <a:spcBef>
+                <a:spcPts val="0"/>
+              </a:spcBef>
+              <a:spcAft>
+                <a:spcPts val="0"/>
+              </a:spcAft>
+              <a:buClr>
+                <a:srgbClr val="000000"/>
+              </a:buClr>
+              <a:buSzPts val="1400"/>
+              <a:buFont typeface="Arial"/>
+              <a:buNone/>
+              <a:defRPr sz="1800" b="0" i="0" u="none" strike="noStrike" cap="none">
+                <a:solidFill>
+                  <a:schemeClr val="dk1"/>
+                </a:solidFill>
+                <a:latin typeface="Arial"/>
+                <a:ea typeface="Arial"/>
+                <a:cs typeface="Arial"/>
+                <a:sym typeface="Arial"/>
+              </a:defRPr>
+            </a:lvl2pPr>
+            <a:lvl3pPr marR="0" lvl="2" algn="l" rtl="0">
+              <a:lnSpc>
+                <a:spcPct val="100000"/>
+              </a:lnSpc>
+              <a:spcBef>
+                <a:spcPts val="0"/>
+              </a:spcBef>
+              <a:spcAft>
+                <a:spcPts val="0"/>
+              </a:spcAft>
+              <a:buClr>
+                <a:srgbClr val="000000"/>
+              </a:buClr>
+              <a:buSzPts val="1400"/>
+              <a:buFont typeface="Arial"/>
+              <a:buNone/>
+              <a:defRPr sz="1800" b="0" i="0" u="none" strike="noStrike" cap="none">
+                <a:solidFill>
+                  <a:schemeClr val="dk1"/>
+                </a:solidFill>
+                <a:latin typeface="Arial"/>
+                <a:ea typeface="Arial"/>
+                <a:cs typeface="Arial"/>
+                <a:sym typeface="Arial"/>
+              </a:defRPr>
+            </a:lvl3pPr>
+            <a:lvl4pPr marR="0" lvl="3" algn="l" rtl="0">
+              <a:lnSpc>
+                <a:spcPct val="100000"/>
+              </a:lnSpc>
+              <a:spcBef>
+                <a:spcPts val="0"/>
+              </a:spcBef>
+              <a:spcAft>
+                <a:spcPts val="0"/>
+              </a:spcAft>
+              <a:buClr>
+                <a:srgbClr val="000000"/>
+              </a:buClr>
+              <a:buSzPts val="1400"/>
+              <a:buFont typeface="Arial"/>
+              <a:buNone/>
+              <a:defRPr sz="1800" b="0" i="0" u="none" strike="noStrike" cap="none">
+                <a:solidFill>
+                  <a:schemeClr val="dk1"/>
+                </a:solidFill>
+                <a:latin typeface="Arial"/>
+                <a:ea typeface="Arial"/>
+                <a:cs typeface="Arial"/>
+                <a:sym typeface="Arial"/>
+              </a:defRPr>
+            </a:lvl4pPr>
+            <a:lvl5pPr marR="0" lvl="4" algn="l" rtl="0">
+              <a:lnSpc>
+                <a:spcPct val="100000"/>
+              </a:lnSpc>
+              <a:spcBef>
+                <a:spcPts val="0"/>
+              </a:spcBef>
+              <a:spcAft>
+                <a:spcPts val="0"/>
+              </a:spcAft>
+              <a:buClr>
+                <a:srgbClr val="000000"/>
+              </a:buClr>
+              <a:buSzPts val="1400"/>
+              <a:buFont typeface="Arial"/>
+              <a:buNone/>
+              <a:defRPr sz="1800" b="0" i="0" u="none" strike="noStrike" cap="none">
+                <a:solidFill>
+                  <a:schemeClr val="dk1"/>
+                </a:solidFill>
+                <a:latin typeface="Arial"/>
+                <a:ea typeface="Arial"/>
+                <a:cs typeface="Arial"/>
+                <a:sym typeface="Arial"/>
+              </a:defRPr>
+            </a:lvl5pPr>
+            <a:lvl6pPr marR="0" lvl="5" algn="l" rtl="0">
+              <a:lnSpc>
+                <a:spcPct val="100000"/>
+              </a:lnSpc>
+              <a:spcBef>
+                <a:spcPts val="0"/>
+              </a:spcBef>
+              <a:spcAft>
+                <a:spcPts val="0"/>
+              </a:spcAft>
+              <a:buClr>
+                <a:srgbClr val="000000"/>
+              </a:buClr>
+              <a:buSzPts val="1400"/>
+              <a:buFont typeface="Arial"/>
+              <a:buNone/>
+              <a:defRPr sz="1800" b="0" i="0" u="none" strike="noStrike" cap="none">
+                <a:solidFill>
+                  <a:schemeClr val="dk1"/>
+                </a:solidFill>
+                <a:latin typeface="Arial"/>
+                <a:ea typeface="Arial"/>
+                <a:cs typeface="Arial"/>
+                <a:sym typeface="Arial"/>
+              </a:defRPr>
+            </a:lvl6pPr>
+            <a:lvl7pPr marR="0" lvl="6" algn="l" rtl="0">
+              <a:lnSpc>
+                <a:spcPct val="100000"/>
+              </a:lnSpc>
+              <a:spcBef>
+                <a:spcPts val="0"/>
+              </a:spcBef>
+              <a:spcAft>
+                <a:spcPts val="0"/>
+              </a:spcAft>
+              <a:buClr>
+                <a:srgbClr val="000000"/>
+              </a:buClr>
+              <a:buSzPts val="1400"/>
+              <a:buFont typeface="Arial"/>
+              <a:buNone/>
+              <a:defRPr sz="1800" b="0" i="0" u="none" strike="noStrike" cap="none">
+                <a:solidFill>
+                  <a:schemeClr val="dk1"/>
+                </a:solidFill>
+                <a:latin typeface="Arial"/>
+                <a:ea typeface="Arial"/>
+                <a:cs typeface="Arial"/>
+                <a:sym typeface="Arial"/>
+              </a:defRPr>
+            </a:lvl7pPr>
+            <a:lvl8pPr marR="0" lvl="7" algn="l" rtl="0">
+              <a:lnSpc>
+                <a:spcPct val="100000"/>
+              </a:lnSpc>
+              <a:spcBef>
+                <a:spcPts val="0"/>
+              </a:spcBef>
+              <a:spcAft>
+                <a:spcPts val="0"/>
+              </a:spcAft>
+              <a:buClr>
+                <a:srgbClr val="000000"/>
+              </a:buClr>
+              <a:buSzPts val="1400"/>
+              <a:buFont typeface="Arial"/>
+              <a:buNone/>
+              <a:defRPr sz="1800" b="0" i="0" u="none" strike="noStrike" cap="none">
+                <a:solidFill>
+                  <a:schemeClr val="dk1"/>
+                </a:solidFill>
+                <a:latin typeface="Arial"/>
+                <a:ea typeface="Arial"/>
+                <a:cs typeface="Arial"/>
+                <a:sym typeface="Arial"/>
+              </a:defRPr>
+            </a:lvl8pPr>
+            <a:lvl9pPr marR="0" lvl="8" algn="l" rtl="0">
+              <a:lnSpc>
+                <a:spcPct val="100000"/>
+              </a:lnSpc>
+              <a:spcBef>
+                <a:spcPts val="0"/>
+              </a:spcBef>
+              <a:spcAft>
+                <a:spcPts val="0"/>
+              </a:spcAft>
+              <a:buClr>
+                <a:srgbClr val="000000"/>
+              </a:buClr>
+              <a:buSzPts val="1400"/>
+              <a:buFont typeface="Arial"/>
+              <a:buNone/>
+              <a:defRPr sz="1800" b="0" i="0" u="none" strike="noStrike" cap="none">
+                <a:solidFill>
+                  <a:schemeClr val="dk1"/>
+                </a:solidFill>
+                <a:latin typeface="Arial"/>
+                <a:ea typeface="Arial"/>
+                <a:cs typeface="Arial"/>
+                <a:sym typeface="Arial"/>
+              </a:defRPr>
+            </a:lvl9pPr>
+          </a:lstStyle>
+          <a:p>
+            <a:r>
+              <a:rPr lang="nl-BE" b="1" dirty="0"/>
+              <a:t>P&amp;O: elektrotechniek </a:t>
+            </a:r>
+            <a:r>
+              <a:rPr lang="nl-BE" dirty="0"/>
+              <a:t>(B-KUL-H01Q6C)</a:t>
+            </a:r>
+          </a:p>
+          <a:p>
+            <a:r>
+              <a:rPr lang="nl-BE" b="1" dirty="0"/>
+              <a:t>EAGLE 2</a:t>
+            </a:r>
+          </a:p>
+          <a:p>
+            <a:r>
+              <a:rPr lang="nl-BE" b="1" dirty="0"/>
+              <a:t>!!!</a:t>
+            </a:r>
+            <a:r>
+              <a:rPr lang="nl-BE" b="1" dirty="0" err="1"/>
+              <a:t>Fill</a:t>
+            </a:r>
+            <a:r>
+              <a:rPr lang="nl-BE" b="1" dirty="0"/>
+              <a:t> in </a:t>
+            </a:r>
+            <a:r>
+              <a:rPr lang="nl-BE" b="1" dirty="0" err="1"/>
+              <a:t>your</a:t>
+            </a:r>
+            <a:r>
+              <a:rPr lang="nl-BE" b="1" dirty="0"/>
+              <a:t> module!!!</a:t>
+            </a:r>
+          </a:p>
+        </p:txBody>
+      </p:sp>
+      <p:pic>
+        <p:nvPicPr>
+          <p:cNvPr id="8" name="Afbeelding 7">
+            <a:extLst>
+              <a:ext uri="{FF2B5EF4-FFF2-40B4-BE49-F238E27FC236}">
+                <a16:creationId xmlns:a16="http://schemas.microsoft.com/office/drawing/2014/main" id="{FF87AD54-75E6-45A0-BF50-99077175D8B6}"/>
+              </a:ext>
+            </a:extLst>
+          </p:cNvPr>
+          <p:cNvPicPr>
+            <a:picLocks noChangeAspect="1"/>
+          </p:cNvPicPr>
+          <p:nvPr/>
+        </p:nvPicPr>
+        <p:blipFill>
+          <a:blip r:embed="rId2"/>
+          <a:stretch>
+            <a:fillRect/>
+          </a:stretch>
+        </p:blipFill>
+        <p:spPr>
+          <a:xfrm>
+            <a:off x="6718862" y="6210000"/>
+            <a:ext cx="719094" cy="683926"/>
+          </a:xfrm>
+          <a:prstGeom prst="rect">
+            <a:avLst/>
+          </a:prstGeom>
+        </p:spPr>
+      </p:pic>
+      <p:pic>
+        <p:nvPicPr>
+          <p:cNvPr id="10" name="Afbeelding 9">
+            <a:extLst>
+              <a:ext uri="{FF2B5EF4-FFF2-40B4-BE49-F238E27FC236}">
+                <a16:creationId xmlns:a16="http://schemas.microsoft.com/office/drawing/2014/main" id="{FA179109-F3DB-4187-BE16-51F5DA6B351E}"/>
+              </a:ext>
+            </a:extLst>
+          </p:cNvPr>
+          <p:cNvPicPr>
+            <a:picLocks noChangeAspect="1"/>
+          </p:cNvPicPr>
+          <p:nvPr/>
+        </p:nvPicPr>
+        <p:blipFill>
+          <a:blip r:embed="rId3"/>
+          <a:stretch>
+            <a:fillRect/>
+          </a:stretch>
+        </p:blipFill>
+        <p:spPr>
+          <a:xfrm>
+            <a:off x="3009678" y="1074198"/>
+            <a:ext cx="6172644" cy="4847229"/>
+          </a:xfrm>
+          <a:prstGeom prst="rect">
+            <a:avLst/>
+          </a:prstGeom>
+        </p:spPr>
+      </p:pic>
+    </p:spTree>
+    <p:extLst>
+      <p:ext uri="{BB962C8B-B14F-4D97-AF65-F5344CB8AC3E}">
+        <p14:creationId xmlns:p14="http://schemas.microsoft.com/office/powerpoint/2010/main" val="2728223818"/>
+      </p:ext>
+    </p:extLst>
+  </p:cSld>
+  <p:clrMapOvr>
+    <a:masterClrMapping/>
+  </p:clrMapOvr>
+</p:sld>
+</file>
+
+<file path=ppt/slides/slide8.xml><?xml version="1.0" encoding="utf-8"?>
+<p:sld xmlns:a="http://schemas.openxmlformats.org/drawingml/2006/main" xmlns:r="http://schemas.openxmlformats.org/officeDocument/2006/relationships" xmlns:p="http://schemas.openxmlformats.org/presentationml/2006/main">
+  <p:cSld>
+    <p:spTree>
+      <p:nvGrpSpPr>
+        <p:cNvPr id="1" name=""/>
+        <p:cNvGrpSpPr/>
+        <p:nvPr/>
+      </p:nvGrpSpPr>
+      <p:grpSpPr>
+        <a:xfrm>
+          <a:off x="0" y="0"/>
+          <a:ext cx="0" cy="0"/>
+          <a:chOff x="0" y="0"/>
+          <a:chExt cx="0" cy="0"/>
+        </a:xfrm>
+      </p:grpSpPr>
+      <p:sp>
+        <p:nvSpPr>
+          <p:cNvPr id="4" name="Tijdelijke aanduiding voor dianummer 3">
+            <a:extLst>
+              <a:ext uri="{FF2B5EF4-FFF2-40B4-BE49-F238E27FC236}">
+                <a16:creationId xmlns:a16="http://schemas.microsoft.com/office/drawing/2014/main" id="{D1DBAB9A-B3F9-4068-8D9E-EC41B3E2AF8F}"/>
+              </a:ext>
+            </a:extLst>
+          </p:cNvPr>
+          <p:cNvSpPr>
+            <a:spLocks noGrp="1"/>
+          </p:cNvSpPr>
+          <p:nvPr>
+            <p:ph type="sldNum" sz="quarter" idx="12"/>
+          </p:nvPr>
+        </p:nvSpPr>
+        <p:spPr/>
+        <p:txBody>
+          <a:bodyPr/>
+          <a:lstStyle/>
+          <a:p>
+            <a:fld id="{0A297500-7527-634B-90F4-69D0994C32B4}" type="slidenum">
+              <a:rPr lang="nl-NL" smtClean="0"/>
+              <a:t>8</a:t>
+            </a:fld>
+            <a:endParaRPr lang="nl-NL"/>
+          </a:p>
+        </p:txBody>
+      </p:sp>
+      <p:sp>
+        <p:nvSpPr>
+          <p:cNvPr id="5" name="Titel 4">
+            <a:extLst>
+              <a:ext uri="{FF2B5EF4-FFF2-40B4-BE49-F238E27FC236}">
+                <a16:creationId xmlns:a16="http://schemas.microsoft.com/office/drawing/2014/main" id="{3A8015CA-63D6-4E43-92D0-5A6E0C7EA02C}"/>
+              </a:ext>
+            </a:extLst>
+          </p:cNvPr>
+          <p:cNvSpPr>
+            <a:spLocks noGrp="1"/>
+          </p:cNvSpPr>
+          <p:nvPr>
+            <p:ph type="title"/>
+          </p:nvPr>
+        </p:nvSpPr>
+        <p:spPr/>
+        <p:txBody>
+          <a:bodyPr>
+            <a:normAutofit/>
+          </a:bodyPr>
+          <a:lstStyle/>
+          <a:p>
+            <a:r>
+              <a:rPr lang="nl-BE" dirty="0" err="1"/>
+              <a:t>Result</a:t>
+            </a:r>
+            <a:endParaRPr lang="nl-BE" dirty="0"/>
+          </a:p>
+        </p:txBody>
+      </p:sp>
+      <p:sp>
+        <p:nvSpPr>
+          <p:cNvPr id="7" name="Tijdelijke aanduiding voor voettekst 1">
+            <a:extLst>
+              <a:ext uri="{FF2B5EF4-FFF2-40B4-BE49-F238E27FC236}">
+                <a16:creationId xmlns:a16="http://schemas.microsoft.com/office/drawing/2014/main" id="{F85CF95F-E3E4-4E64-9557-100028F42EA3}"/>
+              </a:ext>
+            </a:extLst>
+          </p:cNvPr>
+          <p:cNvSpPr txBox="1">
+            <a:spLocks/>
+          </p:cNvSpPr>
+          <p:nvPr/>
+        </p:nvSpPr>
+        <p:spPr>
+          <a:xfrm>
+            <a:off x="6033600" y="6227755"/>
+            <a:ext cx="4993200" cy="648000"/>
+          </a:xfrm>
+          <a:prstGeom prst="rect">
+            <a:avLst/>
+          </a:prstGeom>
+          <a:noFill/>
+          <a:ln>
+            <a:noFill/>
+          </a:ln>
+        </p:spPr>
+        <p:txBody>
+          <a:bodyPr spcFirstLastPara="1" wrap="square" lIns="0" tIns="0" rIns="180000" bIns="0" anchor="ctr" anchorCtr="0">
+            <a:noAutofit/>
+          </a:bodyPr>
+          <a:lstStyle>
+            <a:defPPr marR="0" lvl="0" algn="l" rtl="0">
+              <a:lnSpc>
+                <a:spcPct val="100000"/>
+              </a:lnSpc>
+              <a:spcBef>
+                <a:spcPts val="0"/>
+              </a:spcBef>
+              <a:spcAft>
+                <a:spcPts val="0"/>
+              </a:spcAft>
+            </a:defPPr>
+            <a:lvl1pPr marR="0" lvl="0" algn="r" rtl="0">
+              <a:lnSpc>
+                <a:spcPct val="100000"/>
+              </a:lnSpc>
+              <a:spcBef>
+                <a:spcPts val="0"/>
+              </a:spcBef>
+              <a:spcAft>
+                <a:spcPts val="0"/>
+              </a:spcAft>
+              <a:buClr>
+                <a:srgbClr val="000000"/>
+              </a:buClr>
+              <a:buSzPts val="1400"/>
+              <a:buFont typeface="Arial"/>
+              <a:buNone/>
+              <a:defRPr sz="1000" b="0" i="0" u="none" strike="noStrike" cap="none">
+                <a:solidFill>
+                  <a:schemeClr val="lt1"/>
+                </a:solidFill>
+                <a:latin typeface="Arial"/>
+                <a:ea typeface="Arial"/>
+                <a:cs typeface="Arial"/>
+                <a:sym typeface="Arial"/>
+              </a:defRPr>
+            </a:lvl1pPr>
+            <a:lvl2pPr marR="0" lvl="1" algn="l" rtl="0">
+              <a:lnSpc>
+                <a:spcPct val="100000"/>
+              </a:lnSpc>
+              <a:spcBef>
+                <a:spcPts val="0"/>
+              </a:spcBef>
+              <a:spcAft>
+                <a:spcPts val="0"/>
+              </a:spcAft>
+              <a:buClr>
+                <a:srgbClr val="000000"/>
+              </a:buClr>
+              <a:buSzPts val="1400"/>
+              <a:buFont typeface="Arial"/>
+              <a:buNone/>
+              <a:defRPr sz="1800" b="0" i="0" u="none" strike="noStrike" cap="none">
+                <a:solidFill>
+                  <a:schemeClr val="dk1"/>
+                </a:solidFill>
+                <a:latin typeface="Arial"/>
+                <a:ea typeface="Arial"/>
+                <a:cs typeface="Arial"/>
+                <a:sym typeface="Arial"/>
+              </a:defRPr>
+            </a:lvl2pPr>
+            <a:lvl3pPr marR="0" lvl="2" algn="l" rtl="0">
+              <a:lnSpc>
+                <a:spcPct val="100000"/>
+              </a:lnSpc>
+              <a:spcBef>
+                <a:spcPts val="0"/>
+              </a:spcBef>
+              <a:spcAft>
+                <a:spcPts val="0"/>
+              </a:spcAft>
+              <a:buClr>
+                <a:srgbClr val="000000"/>
+              </a:buClr>
+              <a:buSzPts val="1400"/>
+              <a:buFont typeface="Arial"/>
+              <a:buNone/>
+              <a:defRPr sz="1800" b="0" i="0" u="none" strike="noStrike" cap="none">
+                <a:solidFill>
+                  <a:schemeClr val="dk1"/>
+                </a:solidFill>
+                <a:latin typeface="Arial"/>
+                <a:ea typeface="Arial"/>
+                <a:cs typeface="Arial"/>
+                <a:sym typeface="Arial"/>
+              </a:defRPr>
+            </a:lvl3pPr>
+            <a:lvl4pPr marR="0" lvl="3" algn="l" rtl="0">
+              <a:lnSpc>
+                <a:spcPct val="100000"/>
+              </a:lnSpc>
+              <a:spcBef>
+                <a:spcPts val="0"/>
+              </a:spcBef>
+              <a:spcAft>
+                <a:spcPts val="0"/>
+              </a:spcAft>
+              <a:buClr>
+                <a:srgbClr val="000000"/>
+              </a:buClr>
+              <a:buSzPts val="1400"/>
+              <a:buFont typeface="Arial"/>
+              <a:buNone/>
+              <a:defRPr sz="1800" b="0" i="0" u="none" strike="noStrike" cap="none">
+                <a:solidFill>
+                  <a:schemeClr val="dk1"/>
+                </a:solidFill>
+                <a:latin typeface="Arial"/>
+                <a:ea typeface="Arial"/>
+                <a:cs typeface="Arial"/>
+                <a:sym typeface="Arial"/>
+              </a:defRPr>
+            </a:lvl4pPr>
+            <a:lvl5pPr marR="0" lvl="4" algn="l" rtl="0">
+              <a:lnSpc>
+                <a:spcPct val="100000"/>
+              </a:lnSpc>
+              <a:spcBef>
+                <a:spcPts val="0"/>
+              </a:spcBef>
+              <a:spcAft>
+                <a:spcPts val="0"/>
+              </a:spcAft>
+              <a:buClr>
+                <a:srgbClr val="000000"/>
+              </a:buClr>
+              <a:buSzPts val="1400"/>
+              <a:buFont typeface="Arial"/>
+              <a:buNone/>
+              <a:defRPr sz="1800" b="0" i="0" u="none" strike="noStrike" cap="none">
+                <a:solidFill>
+                  <a:schemeClr val="dk1"/>
+                </a:solidFill>
+                <a:latin typeface="Arial"/>
+                <a:ea typeface="Arial"/>
+                <a:cs typeface="Arial"/>
+                <a:sym typeface="Arial"/>
+              </a:defRPr>
+            </a:lvl5pPr>
+            <a:lvl6pPr marR="0" lvl="5" algn="l" rtl="0">
+              <a:lnSpc>
+                <a:spcPct val="100000"/>
+              </a:lnSpc>
+              <a:spcBef>
+                <a:spcPts val="0"/>
+              </a:spcBef>
+              <a:spcAft>
+                <a:spcPts val="0"/>
+              </a:spcAft>
+              <a:buClr>
+                <a:srgbClr val="000000"/>
+              </a:buClr>
+              <a:buSzPts val="1400"/>
+              <a:buFont typeface="Arial"/>
+              <a:buNone/>
+              <a:defRPr sz="1800" b="0" i="0" u="none" strike="noStrike" cap="none">
+                <a:solidFill>
+                  <a:schemeClr val="dk1"/>
+                </a:solidFill>
+                <a:latin typeface="Arial"/>
+                <a:ea typeface="Arial"/>
+                <a:cs typeface="Arial"/>
+                <a:sym typeface="Arial"/>
+              </a:defRPr>
+            </a:lvl6pPr>
+            <a:lvl7pPr marR="0" lvl="6" algn="l" rtl="0">
+              <a:lnSpc>
+                <a:spcPct val="100000"/>
+              </a:lnSpc>
+              <a:spcBef>
+                <a:spcPts val="0"/>
+              </a:spcBef>
+              <a:spcAft>
+                <a:spcPts val="0"/>
+              </a:spcAft>
+              <a:buClr>
+                <a:srgbClr val="000000"/>
+              </a:buClr>
+              <a:buSzPts val="1400"/>
+              <a:buFont typeface="Arial"/>
+              <a:buNone/>
+              <a:defRPr sz="1800" b="0" i="0" u="none" strike="noStrike" cap="none">
+                <a:solidFill>
+                  <a:schemeClr val="dk1"/>
+                </a:solidFill>
+                <a:latin typeface="Arial"/>
+                <a:ea typeface="Arial"/>
+                <a:cs typeface="Arial"/>
+                <a:sym typeface="Arial"/>
+              </a:defRPr>
+            </a:lvl7pPr>
+            <a:lvl8pPr marR="0" lvl="7" algn="l" rtl="0">
+              <a:lnSpc>
+                <a:spcPct val="100000"/>
+              </a:lnSpc>
+              <a:spcBef>
+                <a:spcPts val="0"/>
+              </a:spcBef>
+              <a:spcAft>
+                <a:spcPts val="0"/>
+              </a:spcAft>
+              <a:buClr>
+                <a:srgbClr val="000000"/>
+              </a:buClr>
+              <a:buSzPts val="1400"/>
+              <a:buFont typeface="Arial"/>
+              <a:buNone/>
+              <a:defRPr sz="1800" b="0" i="0" u="none" strike="noStrike" cap="none">
+                <a:solidFill>
+                  <a:schemeClr val="dk1"/>
+                </a:solidFill>
+                <a:latin typeface="Arial"/>
+                <a:ea typeface="Arial"/>
+                <a:cs typeface="Arial"/>
+                <a:sym typeface="Arial"/>
+              </a:defRPr>
+            </a:lvl8pPr>
+            <a:lvl9pPr marR="0" lvl="8" algn="l" rtl="0">
+              <a:lnSpc>
+                <a:spcPct val="100000"/>
+              </a:lnSpc>
+              <a:spcBef>
+                <a:spcPts val="0"/>
+              </a:spcBef>
+              <a:spcAft>
+                <a:spcPts val="0"/>
+              </a:spcAft>
+              <a:buClr>
+                <a:srgbClr val="000000"/>
+              </a:buClr>
+              <a:buSzPts val="1400"/>
+              <a:buFont typeface="Arial"/>
+              <a:buNone/>
+              <a:defRPr sz="1800" b="0" i="0" u="none" strike="noStrike" cap="none">
+                <a:solidFill>
+                  <a:schemeClr val="dk1"/>
+                </a:solidFill>
+                <a:latin typeface="Arial"/>
+                <a:ea typeface="Arial"/>
+                <a:cs typeface="Arial"/>
+                <a:sym typeface="Arial"/>
+              </a:defRPr>
+            </a:lvl9pPr>
+          </a:lstStyle>
+          <a:p>
+            <a:r>
+              <a:rPr lang="nl-BE" b="1" dirty="0"/>
+              <a:t>P&amp;O: elektrotechniek </a:t>
+            </a:r>
+            <a:r>
+              <a:rPr lang="nl-BE" dirty="0"/>
+              <a:t>(B-KUL-H01Q6C)</a:t>
+            </a:r>
+          </a:p>
+          <a:p>
+            <a:r>
+              <a:rPr lang="nl-BE" b="1" dirty="0"/>
+              <a:t>EAGLE 2</a:t>
+            </a:r>
+          </a:p>
+          <a:p>
+            <a:r>
+              <a:rPr lang="nl-BE" b="1" dirty="0"/>
+              <a:t>!!!</a:t>
+            </a:r>
+            <a:r>
+              <a:rPr lang="nl-BE" b="1" dirty="0" err="1"/>
+              <a:t>Fill</a:t>
+            </a:r>
+            <a:r>
+              <a:rPr lang="nl-BE" b="1" dirty="0"/>
+              <a:t> in </a:t>
+            </a:r>
+            <a:r>
+              <a:rPr lang="nl-BE" b="1" dirty="0" err="1"/>
+              <a:t>your</a:t>
+            </a:r>
+            <a:r>
+              <a:rPr lang="nl-BE" b="1" dirty="0"/>
+              <a:t> module!!!</a:t>
+            </a:r>
+          </a:p>
+        </p:txBody>
+      </p:sp>
+      <p:pic>
+        <p:nvPicPr>
+          <p:cNvPr id="8" name="Afbeelding 7">
+            <a:extLst>
+              <a:ext uri="{FF2B5EF4-FFF2-40B4-BE49-F238E27FC236}">
+                <a16:creationId xmlns:a16="http://schemas.microsoft.com/office/drawing/2014/main" id="{FF87AD54-75E6-45A0-BF50-99077175D8B6}"/>
+              </a:ext>
+            </a:extLst>
+          </p:cNvPr>
+          <p:cNvPicPr>
+            <a:picLocks noChangeAspect="1"/>
+          </p:cNvPicPr>
+          <p:nvPr/>
+        </p:nvPicPr>
+        <p:blipFill>
+          <a:blip r:embed="rId2"/>
+          <a:stretch>
+            <a:fillRect/>
+          </a:stretch>
+        </p:blipFill>
+        <p:spPr>
+          <a:xfrm>
+            <a:off x="6718862" y="6210000"/>
+            <a:ext cx="719094" cy="683926"/>
+          </a:xfrm>
+          <a:prstGeom prst="rect">
+            <a:avLst/>
+          </a:prstGeom>
+        </p:spPr>
+      </p:pic>
+      <p:pic>
+        <p:nvPicPr>
+          <p:cNvPr id="10" name="Tijdelijke aanduiding voor inhoud 9">
+            <a:extLst>
+              <a:ext uri="{FF2B5EF4-FFF2-40B4-BE49-F238E27FC236}">
+                <a16:creationId xmlns:a16="http://schemas.microsoft.com/office/drawing/2014/main" id="{E5C96095-E72F-478A-80D8-B2FEDCDF61FB}"/>
+              </a:ext>
+            </a:extLst>
+          </p:cNvPr>
+          <p:cNvPicPr>
+            <a:picLocks noGrp="1" noChangeAspect="1"/>
+          </p:cNvPicPr>
+          <p:nvPr>
+            <p:ph idx="1"/>
+          </p:nvPr>
+        </p:nvPicPr>
+        <p:blipFill>
+          <a:blip r:embed="rId3"/>
+          <a:stretch>
+            <a:fillRect/>
+          </a:stretch>
+        </p:blipFill>
+        <p:spPr>
+          <a:xfrm>
+            <a:off x="1622909" y="1376791"/>
+            <a:ext cx="8821381" cy="4324954"/>
+          </a:xfrm>
+        </p:spPr>
+      </p:pic>
+    </p:spTree>
+    <p:extLst>
+      <p:ext uri="{BB962C8B-B14F-4D97-AF65-F5344CB8AC3E}">
+        <p14:creationId xmlns:p14="http://schemas.microsoft.com/office/powerpoint/2010/main" val="2778558508"/>
+      </p:ext>
+    </p:extLst>
+  </p:cSld>
+  <p:clrMapOvr>
+    <a:masterClrMapping/>
+  </p:clrMapOvr>
+</p:sld>
+</file>
+
+<file path=ppt/slides/slide9.xml><?xml version="1.0" encoding="utf-8"?>
+<p:sld xmlns:a="http://schemas.openxmlformats.org/drawingml/2006/main" xmlns:r="http://schemas.openxmlformats.org/officeDocument/2006/relationships" xmlns:p="http://schemas.openxmlformats.org/presentationml/2006/main">
+  <p:cSld>
+    <p:spTree>
+      <p:nvGrpSpPr>
+        <p:cNvPr id="1" name=""/>
+        <p:cNvGrpSpPr/>
+        <p:nvPr/>
+      </p:nvGrpSpPr>
+      <p:grpSpPr>
+        <a:xfrm>
+          <a:off x="0" y="0"/>
+          <a:ext cx="0" cy="0"/>
+          <a:chOff x="0" y="0"/>
+          <a:chExt cx="0" cy="0"/>
+        </a:xfrm>
+      </p:grpSpPr>
+      <p:sp>
+        <p:nvSpPr>
+          <p:cNvPr id="4" name="Tijdelijke aanduiding voor dianummer 3">
+            <a:extLst>
+              <a:ext uri="{FF2B5EF4-FFF2-40B4-BE49-F238E27FC236}">
+                <a16:creationId xmlns:a16="http://schemas.microsoft.com/office/drawing/2014/main" id="{D1DBAB9A-B3F9-4068-8D9E-EC41B3E2AF8F}"/>
+              </a:ext>
+            </a:extLst>
+          </p:cNvPr>
+          <p:cNvSpPr>
+            <a:spLocks noGrp="1"/>
+          </p:cNvSpPr>
+          <p:nvPr>
+            <p:ph type="sldNum" sz="quarter" idx="12"/>
+          </p:nvPr>
+        </p:nvSpPr>
+        <p:spPr/>
+        <p:txBody>
+          <a:bodyPr/>
+          <a:lstStyle/>
+          <a:p>
+            <a:fld id="{0A297500-7527-634B-90F4-69D0994C32B4}" type="slidenum">
+              <a:rPr lang="nl-NL" smtClean="0"/>
+              <a:t>9</a:t>
+            </a:fld>
+            <a:endParaRPr lang="nl-NL"/>
+          </a:p>
+        </p:txBody>
+      </p:sp>
+      <p:sp>
+        <p:nvSpPr>
+          <p:cNvPr id="5" name="Titel 4">
+            <a:extLst>
+              <a:ext uri="{FF2B5EF4-FFF2-40B4-BE49-F238E27FC236}">
+                <a16:creationId xmlns:a16="http://schemas.microsoft.com/office/drawing/2014/main" id="{3A8015CA-63D6-4E43-92D0-5A6E0C7EA02C}"/>
+              </a:ext>
+            </a:extLst>
+          </p:cNvPr>
+          <p:cNvSpPr>
+            <a:spLocks noGrp="1"/>
+          </p:cNvSpPr>
+          <p:nvPr>
+            <p:ph type="title"/>
+          </p:nvPr>
+        </p:nvSpPr>
+        <p:spPr/>
+        <p:txBody>
+          <a:bodyPr>
+            <a:normAutofit/>
+          </a:bodyPr>
+          <a:lstStyle/>
+          <a:p>
+            <a:r>
+              <a:rPr lang="nl-BE" dirty="0" err="1"/>
+              <a:t>Result</a:t>
+            </a:r>
+            <a:r>
+              <a:rPr lang="nl-BE" dirty="0"/>
+              <a:t>: </a:t>
+            </a:r>
+            <a:r>
+              <a:rPr lang="nl-BE" dirty="0" err="1"/>
+              <a:t>validation</a:t>
+            </a:r>
+            <a:endParaRPr lang="nl-BE" dirty="0"/>
+          </a:p>
+        </p:txBody>
+      </p:sp>
+      <p:sp>
+        <p:nvSpPr>
+          <p:cNvPr id="7" name="Tijdelijke aanduiding voor voettekst 1">
+            <a:extLst>
+              <a:ext uri="{FF2B5EF4-FFF2-40B4-BE49-F238E27FC236}">
+                <a16:creationId xmlns:a16="http://schemas.microsoft.com/office/drawing/2014/main" id="{F85CF95F-E3E4-4E64-9557-100028F42EA3}"/>
+              </a:ext>
+            </a:extLst>
+          </p:cNvPr>
+          <p:cNvSpPr txBox="1">
+            <a:spLocks/>
+          </p:cNvSpPr>
+          <p:nvPr/>
+        </p:nvSpPr>
+        <p:spPr>
+          <a:xfrm>
+            <a:off x="6033600" y="6227755"/>
+            <a:ext cx="4993200" cy="648000"/>
+          </a:xfrm>
+          <a:prstGeom prst="rect">
+            <a:avLst/>
+          </a:prstGeom>
+          <a:noFill/>
+          <a:ln>
+            <a:noFill/>
+          </a:ln>
+        </p:spPr>
+        <p:txBody>
+          <a:bodyPr spcFirstLastPara="1" wrap="square" lIns="0" tIns="0" rIns="180000" bIns="0" anchor="ctr" anchorCtr="0">
+            <a:noAutofit/>
+          </a:bodyPr>
+          <a:lstStyle>
+            <a:defPPr marR="0" lvl="0" algn="l" rtl="0">
+              <a:lnSpc>
+                <a:spcPct val="100000"/>
+              </a:lnSpc>
+              <a:spcBef>
+                <a:spcPts val="0"/>
+              </a:spcBef>
+              <a:spcAft>
+                <a:spcPts val="0"/>
+              </a:spcAft>
+            </a:defPPr>
+            <a:lvl1pPr marR="0" lvl="0" algn="r" rtl="0">
+              <a:lnSpc>
+                <a:spcPct val="100000"/>
+              </a:lnSpc>
+              <a:spcBef>
+                <a:spcPts val="0"/>
+              </a:spcBef>
+              <a:spcAft>
+                <a:spcPts val="0"/>
+              </a:spcAft>
+              <a:buClr>
+                <a:srgbClr val="000000"/>
+              </a:buClr>
+              <a:buSzPts val="1400"/>
+              <a:buFont typeface="Arial"/>
+              <a:buNone/>
+              <a:defRPr sz="1000" b="0" i="0" u="none" strike="noStrike" cap="none">
+                <a:solidFill>
+                  <a:schemeClr val="lt1"/>
+                </a:solidFill>
+                <a:latin typeface="Arial"/>
+                <a:ea typeface="Arial"/>
+                <a:cs typeface="Arial"/>
+                <a:sym typeface="Arial"/>
+              </a:defRPr>
+            </a:lvl1pPr>
+            <a:lvl2pPr marR="0" lvl="1" algn="l" rtl="0">
+              <a:lnSpc>
+                <a:spcPct val="100000"/>
+              </a:lnSpc>
+              <a:spcBef>
+                <a:spcPts val="0"/>
+              </a:spcBef>
+              <a:spcAft>
+                <a:spcPts val="0"/>
+              </a:spcAft>
+              <a:buClr>
+                <a:srgbClr val="000000"/>
+              </a:buClr>
+              <a:buSzPts val="1400"/>
+              <a:buFont typeface="Arial"/>
+              <a:buNone/>
+              <a:defRPr sz="1800" b="0" i="0" u="none" strike="noStrike" cap="none">
+                <a:solidFill>
+                  <a:schemeClr val="dk1"/>
+                </a:solidFill>
+                <a:latin typeface="Arial"/>
+                <a:ea typeface="Arial"/>
+                <a:cs typeface="Arial"/>
+                <a:sym typeface="Arial"/>
+              </a:defRPr>
+            </a:lvl2pPr>
+            <a:lvl3pPr marR="0" lvl="2" algn="l" rtl="0">
+              <a:lnSpc>
+                <a:spcPct val="100000"/>
+              </a:lnSpc>
+              <a:spcBef>
+                <a:spcPts val="0"/>
+              </a:spcBef>
+              <a:spcAft>
+                <a:spcPts val="0"/>
+              </a:spcAft>
+              <a:buClr>
+                <a:srgbClr val="000000"/>
+              </a:buClr>
+              <a:buSzPts val="1400"/>
+              <a:buFont typeface="Arial"/>
+              <a:buNone/>
+              <a:defRPr sz="1800" b="0" i="0" u="none" strike="noStrike" cap="none">
+                <a:solidFill>
+                  <a:schemeClr val="dk1"/>
+                </a:solidFill>
+                <a:latin typeface="Arial"/>
+                <a:ea typeface="Arial"/>
+                <a:cs typeface="Arial"/>
+                <a:sym typeface="Arial"/>
+              </a:defRPr>
+            </a:lvl3pPr>
+            <a:lvl4pPr marR="0" lvl="3" algn="l" rtl="0">
+              <a:lnSpc>
+                <a:spcPct val="100000"/>
+              </a:lnSpc>
+              <a:spcBef>
+                <a:spcPts val="0"/>
+              </a:spcBef>
+              <a:spcAft>
+                <a:spcPts val="0"/>
+              </a:spcAft>
+              <a:buClr>
+                <a:srgbClr val="000000"/>
+              </a:buClr>
+              <a:buSzPts val="1400"/>
+              <a:buFont typeface="Arial"/>
+              <a:buNone/>
+              <a:defRPr sz="1800" b="0" i="0" u="none" strike="noStrike" cap="none">
+                <a:solidFill>
+                  <a:schemeClr val="dk1"/>
+                </a:solidFill>
+                <a:latin typeface="Arial"/>
+                <a:ea typeface="Arial"/>
+                <a:cs typeface="Arial"/>
+                <a:sym typeface="Arial"/>
+              </a:defRPr>
+            </a:lvl4pPr>
+            <a:lvl5pPr marR="0" lvl="4" algn="l" rtl="0">
+              <a:lnSpc>
+                <a:spcPct val="100000"/>
+              </a:lnSpc>
+              <a:spcBef>
+                <a:spcPts val="0"/>
+              </a:spcBef>
+              <a:spcAft>
+                <a:spcPts val="0"/>
+              </a:spcAft>
+              <a:buClr>
+                <a:srgbClr val="000000"/>
+              </a:buClr>
+              <a:buSzPts val="1400"/>
+              <a:buFont typeface="Arial"/>
+              <a:buNone/>
+              <a:defRPr sz="1800" b="0" i="0" u="none" strike="noStrike" cap="none">
+                <a:solidFill>
+                  <a:schemeClr val="dk1"/>
+                </a:solidFill>
+                <a:latin typeface="Arial"/>
+                <a:ea typeface="Arial"/>
+                <a:cs typeface="Arial"/>
+                <a:sym typeface="Arial"/>
+              </a:defRPr>
+            </a:lvl5pPr>
+            <a:lvl6pPr marR="0" lvl="5" algn="l" rtl="0">
+              <a:lnSpc>
+                <a:spcPct val="100000"/>
+              </a:lnSpc>
+              <a:spcBef>
+                <a:spcPts val="0"/>
+              </a:spcBef>
+              <a:spcAft>
+                <a:spcPts val="0"/>
+              </a:spcAft>
+              <a:buClr>
+                <a:srgbClr val="000000"/>
+              </a:buClr>
+              <a:buSzPts val="1400"/>
+              <a:buFont typeface="Arial"/>
+              <a:buNone/>
+              <a:defRPr sz="1800" b="0" i="0" u="none" strike="noStrike" cap="none">
+                <a:solidFill>
+                  <a:schemeClr val="dk1"/>
+                </a:solidFill>
+                <a:latin typeface="Arial"/>
+                <a:ea typeface="Arial"/>
+                <a:cs typeface="Arial"/>
+                <a:sym typeface="Arial"/>
+              </a:defRPr>
+            </a:lvl6pPr>
+            <a:lvl7pPr marR="0" lvl="6" algn="l" rtl="0">
+              <a:lnSpc>
+                <a:spcPct val="100000"/>
+              </a:lnSpc>
+              <a:spcBef>
+                <a:spcPts val="0"/>
+              </a:spcBef>
+              <a:spcAft>
+                <a:spcPts val="0"/>
+              </a:spcAft>
+              <a:buClr>
+                <a:srgbClr val="000000"/>
+              </a:buClr>
+              <a:buSzPts val="1400"/>
+              <a:buFont typeface="Arial"/>
+              <a:buNone/>
+              <a:defRPr sz="1800" b="0" i="0" u="none" strike="noStrike" cap="none">
+                <a:solidFill>
+                  <a:schemeClr val="dk1"/>
+                </a:solidFill>
+                <a:latin typeface="Arial"/>
+                <a:ea typeface="Arial"/>
+                <a:cs typeface="Arial"/>
+                <a:sym typeface="Arial"/>
+              </a:defRPr>
+            </a:lvl7pPr>
+            <a:lvl8pPr marR="0" lvl="7" algn="l" rtl="0">
+              <a:lnSpc>
+                <a:spcPct val="100000"/>
+              </a:lnSpc>
+              <a:spcBef>
+                <a:spcPts val="0"/>
+              </a:spcBef>
+              <a:spcAft>
+                <a:spcPts val="0"/>
+              </a:spcAft>
+              <a:buClr>
+                <a:srgbClr val="000000"/>
+              </a:buClr>
+              <a:buSzPts val="1400"/>
+              <a:buFont typeface="Arial"/>
+              <a:buNone/>
+              <a:defRPr sz="1800" b="0" i="0" u="none" strike="noStrike" cap="none">
+                <a:solidFill>
+                  <a:schemeClr val="dk1"/>
+                </a:solidFill>
+                <a:latin typeface="Arial"/>
+                <a:ea typeface="Arial"/>
+                <a:cs typeface="Arial"/>
+                <a:sym typeface="Arial"/>
+              </a:defRPr>
+            </a:lvl8pPr>
+            <a:lvl9pPr marR="0" lvl="8" algn="l" rtl="0">
+              <a:lnSpc>
+                <a:spcPct val="100000"/>
+              </a:lnSpc>
+              <a:spcBef>
+                <a:spcPts val="0"/>
+              </a:spcBef>
+              <a:spcAft>
+                <a:spcPts val="0"/>
+              </a:spcAft>
+              <a:buClr>
+                <a:srgbClr val="000000"/>
+              </a:buClr>
+              <a:buSzPts val="1400"/>
+              <a:buFont typeface="Arial"/>
+              <a:buNone/>
+              <a:defRPr sz="1800" b="0" i="0" u="none" strike="noStrike" cap="none">
+                <a:solidFill>
+                  <a:schemeClr val="dk1"/>
+                </a:solidFill>
+                <a:latin typeface="Arial"/>
+                <a:ea typeface="Arial"/>
+                <a:cs typeface="Arial"/>
+                <a:sym typeface="Arial"/>
+              </a:defRPr>
+            </a:lvl9pPr>
+          </a:lstStyle>
+          <a:p>
+            <a:r>
+              <a:rPr lang="nl-BE" b="1" dirty="0"/>
+              <a:t>P&amp;O: elektrotechniek </a:t>
+            </a:r>
+            <a:r>
+              <a:rPr lang="nl-BE" dirty="0"/>
+              <a:t>(B-KUL-H01Q6C)</a:t>
+            </a:r>
+          </a:p>
+          <a:p>
+            <a:r>
+              <a:rPr lang="nl-BE" b="1" dirty="0"/>
+              <a:t>EAGLE 2</a:t>
+            </a:r>
+          </a:p>
+          <a:p>
+            <a:r>
+              <a:rPr lang="nl-BE" b="1" dirty="0"/>
+              <a:t>!!!</a:t>
+            </a:r>
+            <a:r>
+              <a:rPr lang="nl-BE" b="1" dirty="0" err="1"/>
+              <a:t>Fill</a:t>
+            </a:r>
+            <a:r>
+              <a:rPr lang="nl-BE" b="1" dirty="0"/>
+              <a:t> in </a:t>
+            </a:r>
+            <a:r>
+              <a:rPr lang="nl-BE" b="1" dirty="0" err="1"/>
+              <a:t>your</a:t>
+            </a:r>
+            <a:r>
+              <a:rPr lang="nl-BE" b="1" dirty="0"/>
+              <a:t> module!!!</a:t>
+            </a:r>
+          </a:p>
+        </p:txBody>
+      </p:sp>
+      <p:pic>
+        <p:nvPicPr>
+          <p:cNvPr id="8" name="Afbeelding 7">
+            <a:extLst>
+              <a:ext uri="{FF2B5EF4-FFF2-40B4-BE49-F238E27FC236}">
+                <a16:creationId xmlns:a16="http://schemas.microsoft.com/office/drawing/2014/main" id="{FF87AD54-75E6-45A0-BF50-99077175D8B6}"/>
+              </a:ext>
+            </a:extLst>
+          </p:cNvPr>
+          <p:cNvPicPr>
+            <a:picLocks noChangeAspect="1"/>
+          </p:cNvPicPr>
+          <p:nvPr/>
+        </p:nvPicPr>
+        <p:blipFill>
+          <a:blip r:embed="rId2"/>
+          <a:stretch>
+            <a:fillRect/>
+          </a:stretch>
+        </p:blipFill>
+        <p:spPr>
+          <a:xfrm>
+            <a:off x="6718862" y="6210000"/>
+            <a:ext cx="719094" cy="683926"/>
+          </a:xfrm>
+          <a:prstGeom prst="rect">
+            <a:avLst/>
+          </a:prstGeom>
+        </p:spPr>
+      </p:pic>
+      <p:pic>
+        <p:nvPicPr>
+          <p:cNvPr id="10" name="Tijdelijke aanduiding voor inhoud 9">
+            <a:extLst>
+              <a:ext uri="{FF2B5EF4-FFF2-40B4-BE49-F238E27FC236}">
+                <a16:creationId xmlns:a16="http://schemas.microsoft.com/office/drawing/2014/main" id="{019C7CF1-A5CA-40E3-A14A-4DC768358BF4}"/>
+              </a:ext>
+            </a:extLst>
+          </p:cNvPr>
+          <p:cNvPicPr>
+            <a:picLocks noGrp="1" noChangeAspect="1"/>
+          </p:cNvPicPr>
+          <p:nvPr>
+            <p:ph idx="1"/>
+          </p:nvPr>
+        </p:nvPicPr>
+        <p:blipFill>
+          <a:blip r:embed="rId3"/>
+          <a:stretch>
+            <a:fillRect/>
+          </a:stretch>
+        </p:blipFill>
+        <p:spPr>
+          <a:xfrm>
+            <a:off x="419199" y="1543615"/>
+            <a:ext cx="5614401" cy="4464050"/>
+          </a:xfrm>
+        </p:spPr>
+      </p:pic>
+      <p:pic>
+        <p:nvPicPr>
+          <p:cNvPr id="12" name="Afbeelding 11">
+            <a:extLst>
+              <a:ext uri="{FF2B5EF4-FFF2-40B4-BE49-F238E27FC236}">
+                <a16:creationId xmlns:a16="http://schemas.microsoft.com/office/drawing/2014/main" id="{8AA9A421-1416-4940-A84F-1361FB95189C}"/>
+              </a:ext>
+            </a:extLst>
+          </p:cNvPr>
+          <p:cNvPicPr>
+            <a:picLocks noChangeAspect="1"/>
+          </p:cNvPicPr>
+          <p:nvPr/>
+        </p:nvPicPr>
+        <p:blipFill>
+          <a:blip r:embed="rId4"/>
+          <a:stretch>
+            <a:fillRect/>
+          </a:stretch>
+        </p:blipFill>
+        <p:spPr>
+          <a:xfrm>
+            <a:off x="6229433" y="1543615"/>
+            <a:ext cx="5543368" cy="4464051"/>
+          </a:xfrm>
+          <a:prstGeom prst="rect">
+            <a:avLst/>
+          </a:prstGeom>
+        </p:spPr>
+      </p:pic>
+    </p:spTree>
+    <p:extLst>
+      <p:ext uri="{BB962C8B-B14F-4D97-AF65-F5344CB8AC3E}">
+        <p14:creationId xmlns:p14="http://schemas.microsoft.com/office/powerpoint/2010/main" val="418483871"/>
       </p:ext>
     </p:extLst>
   </p:cSld>

</xml_diff>